<commit_message>
added design patterns for curs 5
</commit_message>
<xml_diff>
--- a/curs4/src/main/resources/DesignPatterns.pptx
+++ b/curs4/src/main/resources/DesignPatterns.pptx
@@ -13,7 +13,23 @@
     <p:sldId id="260" r:id="rId7"/>
     <p:sldId id="262" r:id="rId8"/>
     <p:sldId id="264" r:id="rId9"/>
-    <p:sldId id="263" r:id="rId10"/>
+    <p:sldId id="265" r:id="rId10"/>
+    <p:sldId id="266" r:id="rId11"/>
+    <p:sldId id="267" r:id="rId12"/>
+    <p:sldId id="268" r:id="rId13"/>
+    <p:sldId id="269" r:id="rId14"/>
+    <p:sldId id="263" r:id="rId15"/>
+    <p:sldId id="270" r:id="rId16"/>
+    <p:sldId id="271" r:id="rId17"/>
+    <p:sldId id="272" r:id="rId18"/>
+    <p:sldId id="273" r:id="rId19"/>
+    <p:sldId id="274" r:id="rId20"/>
+    <p:sldId id="275" r:id="rId21"/>
+    <p:sldId id="280" r:id="rId22"/>
+    <p:sldId id="276" r:id="rId23"/>
+    <p:sldId id="279" r:id="rId24"/>
+    <p:sldId id="277" r:id="rId25"/>
+    <p:sldId id="278" r:id="rId26"/>
   </p:sldIdLst>
   <p:sldSz cx="9144000" cy="6858000" type="screen4x3"/>
   <p:notesSz cx="6858000" cy="9144000"/>
@@ -297,7 +313,7 @@
             <a:fld id="{505251C1-60C0-424E-AF6B-263176C83A93}" type="datetimeFigureOut">
               <a:rPr lang="en-US" smtClean="0"/>
               <a:pPr/>
-              <a:t>03/11/16</a:t>
+              <a:t>05/11/16</a:t>
             </a:fld>
             <a:endParaRPr lang="en-US"/>
           </a:p>
@@ -464,7 +480,7 @@
             <a:fld id="{505251C1-60C0-424E-AF6B-263176C83A93}" type="datetimeFigureOut">
               <a:rPr lang="en-US" smtClean="0"/>
               <a:pPr/>
-              <a:t>03/11/16</a:t>
+              <a:t>05/11/16</a:t>
             </a:fld>
             <a:endParaRPr lang="en-US"/>
           </a:p>
@@ -641,7 +657,7 @@
             <a:fld id="{505251C1-60C0-424E-AF6B-263176C83A93}" type="datetimeFigureOut">
               <a:rPr lang="en-US" smtClean="0"/>
               <a:pPr/>
-              <a:t>03/11/16</a:t>
+              <a:t>05/11/16</a:t>
             </a:fld>
             <a:endParaRPr lang="en-US"/>
           </a:p>
@@ -808,7 +824,7 @@
             <a:fld id="{505251C1-60C0-424E-AF6B-263176C83A93}" type="datetimeFigureOut">
               <a:rPr lang="en-US" smtClean="0"/>
               <a:pPr/>
-              <a:t>03/11/16</a:t>
+              <a:t>05/11/16</a:t>
             </a:fld>
             <a:endParaRPr lang="en-US"/>
           </a:p>
@@ -1051,7 +1067,7 @@
             <a:fld id="{505251C1-60C0-424E-AF6B-263176C83A93}" type="datetimeFigureOut">
               <a:rPr lang="en-US" smtClean="0"/>
               <a:pPr/>
-              <a:t>03/11/16</a:t>
+              <a:t>05/11/16</a:t>
             </a:fld>
             <a:endParaRPr lang="en-US"/>
           </a:p>
@@ -1336,7 +1352,7 @@
             <a:fld id="{505251C1-60C0-424E-AF6B-263176C83A93}" type="datetimeFigureOut">
               <a:rPr lang="en-US" smtClean="0"/>
               <a:pPr/>
-              <a:t>03/11/16</a:t>
+              <a:t>05/11/16</a:t>
             </a:fld>
             <a:endParaRPr lang="en-US"/>
           </a:p>
@@ -1755,7 +1771,7 @@
             <a:fld id="{505251C1-60C0-424E-AF6B-263176C83A93}" type="datetimeFigureOut">
               <a:rPr lang="en-US" smtClean="0"/>
               <a:pPr/>
-              <a:t>03/11/16</a:t>
+              <a:t>05/11/16</a:t>
             </a:fld>
             <a:endParaRPr lang="en-US"/>
           </a:p>
@@ -1870,7 +1886,7 @@
             <a:fld id="{505251C1-60C0-424E-AF6B-263176C83A93}" type="datetimeFigureOut">
               <a:rPr lang="en-US" smtClean="0"/>
               <a:pPr/>
-              <a:t>03/11/16</a:t>
+              <a:t>05/11/16</a:t>
             </a:fld>
             <a:endParaRPr lang="en-US"/>
           </a:p>
@@ -1962,7 +1978,7 @@
             <a:fld id="{505251C1-60C0-424E-AF6B-263176C83A93}" type="datetimeFigureOut">
               <a:rPr lang="en-US" smtClean="0"/>
               <a:pPr/>
-              <a:t>03/11/16</a:t>
+              <a:t>05/11/16</a:t>
             </a:fld>
             <a:endParaRPr lang="en-US"/>
           </a:p>
@@ -2236,7 +2252,7 @@
             <a:fld id="{505251C1-60C0-424E-AF6B-263176C83A93}" type="datetimeFigureOut">
               <a:rPr lang="en-US" smtClean="0"/>
               <a:pPr/>
-              <a:t>03/11/16</a:t>
+              <a:t>05/11/16</a:t>
             </a:fld>
             <a:endParaRPr lang="en-US"/>
           </a:p>
@@ -2486,7 +2502,7 @@
             <a:fld id="{505251C1-60C0-424E-AF6B-263176C83A93}" type="datetimeFigureOut">
               <a:rPr lang="en-US" smtClean="0"/>
               <a:pPr/>
-              <a:t>03/11/16</a:t>
+              <a:t>05/11/16</a:t>
             </a:fld>
             <a:endParaRPr lang="en-US"/>
           </a:p>
@@ -2696,7 +2712,7 @@
             <a:fld id="{505251C1-60C0-424E-AF6B-263176C83A93}" type="datetimeFigureOut">
               <a:rPr lang="en-US" smtClean="0"/>
               <a:pPr/>
-              <a:t>03/11/16</a:t>
+              <a:t>05/11/16</a:t>
             </a:fld>
             <a:endParaRPr lang="en-US"/>
           </a:p>
@@ -3103,6 +3119,796 @@
 </p:sld>
 </file>
 
+<file path=ppt/slides/slide10.xml><?xml version="1.0" encoding="utf-8"?>
+<p:sld xmlns:a="http://schemas.openxmlformats.org/drawingml/2006/main" xmlns:r="http://schemas.openxmlformats.org/officeDocument/2006/relationships" xmlns:p="http://schemas.openxmlformats.org/presentationml/2006/main">
+  <p:cSld>
+    <p:spTree>
+      <p:nvGrpSpPr>
+        <p:cNvPr id="1" name=""/>
+        <p:cNvGrpSpPr/>
+        <p:nvPr/>
+      </p:nvGrpSpPr>
+      <p:grpSpPr>
+        <a:xfrm>
+          <a:off x="0" y="0"/>
+          <a:ext cx="0" cy="0"/>
+          <a:chOff x="0" y="0"/>
+          <a:chExt cx="0" cy="0"/>
+        </a:xfrm>
+      </p:grpSpPr>
+      <p:sp>
+        <p:nvSpPr>
+          <p:cNvPr id="2" name="Title 1"/>
+          <p:cNvSpPr>
+            <a:spLocks noGrp="1"/>
+          </p:cNvSpPr>
+          <p:nvPr>
+            <p:ph type="ctrTitle"/>
+          </p:nvPr>
+        </p:nvSpPr>
+        <p:spPr>
+          <a:xfrm>
+            <a:off x="533400" y="1"/>
+            <a:ext cx="7772400" cy="1143000"/>
+          </a:xfrm>
+        </p:spPr>
+        <p:txBody>
+          <a:bodyPr/>
+          <a:lstStyle/>
+          <a:p>
+            <a:r>
+              <a:rPr lang="en-US" dirty="0" err="1" smtClean="0"/>
+              <a:t>Iterator</a:t>
+            </a:r>
+            <a:endParaRPr lang="en-US" dirty="0"/>
+          </a:p>
+        </p:txBody>
+      </p:sp>
+      <p:pic>
+        <p:nvPicPr>
+          <p:cNvPr id="2050" name="Picture 2"/>
+          <p:cNvPicPr>
+            <a:picLocks noChangeAspect="1" noChangeArrowheads="1"/>
+          </p:cNvPicPr>
+          <p:nvPr/>
+        </p:nvPicPr>
+        <p:blipFill>
+          <a:blip r:embed="rId2" cstate="print"/>
+          <a:srcRect/>
+          <a:stretch>
+            <a:fillRect/>
+          </a:stretch>
+        </p:blipFill>
+        <p:spPr bwMode="auto">
+          <a:xfrm>
+            <a:off x="185738" y="1243013"/>
+            <a:ext cx="8772525" cy="4371975"/>
+          </a:xfrm>
+          <a:prstGeom prst="rect">
+            <a:avLst/>
+          </a:prstGeom>
+          <a:noFill/>
+          <a:ln w="9525">
+            <a:noFill/>
+            <a:miter lim="800000"/>
+            <a:headEnd/>
+            <a:tailEnd/>
+          </a:ln>
+        </p:spPr>
+      </p:pic>
+    </p:spTree>
+  </p:cSld>
+  <p:clrMapOvr>
+    <a:masterClrMapping/>
+  </p:clrMapOvr>
+</p:sld>
+</file>
+
+<file path=ppt/slides/slide11.xml><?xml version="1.0" encoding="utf-8"?>
+<p:sld xmlns:a="http://schemas.openxmlformats.org/drawingml/2006/main" xmlns:r="http://schemas.openxmlformats.org/officeDocument/2006/relationships" xmlns:p="http://schemas.openxmlformats.org/presentationml/2006/main">
+  <p:cSld>
+    <p:spTree>
+      <p:nvGrpSpPr>
+        <p:cNvPr id="1" name=""/>
+        <p:cNvGrpSpPr/>
+        <p:nvPr/>
+      </p:nvGrpSpPr>
+      <p:grpSpPr>
+        <a:xfrm>
+          <a:off x="0" y="0"/>
+          <a:ext cx="0" cy="0"/>
+          <a:chOff x="0" y="0"/>
+          <a:chExt cx="0" cy="0"/>
+        </a:xfrm>
+      </p:grpSpPr>
+      <p:sp>
+        <p:nvSpPr>
+          <p:cNvPr id="2" name="Title 1"/>
+          <p:cNvSpPr>
+            <a:spLocks noGrp="1"/>
+          </p:cNvSpPr>
+          <p:nvPr>
+            <p:ph type="ctrTitle"/>
+          </p:nvPr>
+        </p:nvSpPr>
+        <p:spPr>
+          <a:xfrm>
+            <a:off x="533400" y="1"/>
+            <a:ext cx="7772400" cy="1143000"/>
+          </a:xfrm>
+        </p:spPr>
+        <p:txBody>
+          <a:bodyPr/>
+          <a:lstStyle/>
+          <a:p>
+            <a:r>
+              <a:rPr lang="en-US" dirty="0" smtClean="0"/>
+              <a:t>Observer</a:t>
+            </a:r>
+            <a:endParaRPr lang="en-US" dirty="0"/>
+          </a:p>
+        </p:txBody>
+      </p:sp>
+      <p:pic>
+        <p:nvPicPr>
+          <p:cNvPr id="3074" name="Picture 2"/>
+          <p:cNvPicPr>
+            <a:picLocks noChangeAspect="1" noChangeArrowheads="1"/>
+          </p:cNvPicPr>
+          <p:nvPr/>
+        </p:nvPicPr>
+        <p:blipFill>
+          <a:blip r:embed="rId2" cstate="print"/>
+          <a:srcRect/>
+          <a:stretch>
+            <a:fillRect/>
+          </a:stretch>
+        </p:blipFill>
+        <p:spPr bwMode="auto">
+          <a:xfrm>
+            <a:off x="147638" y="990600"/>
+            <a:ext cx="8848725" cy="5529263"/>
+          </a:xfrm>
+          <a:prstGeom prst="rect">
+            <a:avLst/>
+          </a:prstGeom>
+          <a:noFill/>
+          <a:ln w="9525">
+            <a:noFill/>
+            <a:miter lim="800000"/>
+            <a:headEnd/>
+            <a:tailEnd/>
+          </a:ln>
+        </p:spPr>
+      </p:pic>
+    </p:spTree>
+  </p:cSld>
+  <p:clrMapOvr>
+    <a:masterClrMapping/>
+  </p:clrMapOvr>
+</p:sld>
+</file>
+
+<file path=ppt/slides/slide12.xml><?xml version="1.0" encoding="utf-8"?>
+<p:sld xmlns:a="http://schemas.openxmlformats.org/drawingml/2006/main" xmlns:r="http://schemas.openxmlformats.org/officeDocument/2006/relationships" xmlns:p="http://schemas.openxmlformats.org/presentationml/2006/main">
+  <p:cSld>
+    <p:spTree>
+      <p:nvGrpSpPr>
+        <p:cNvPr id="1" name=""/>
+        <p:cNvGrpSpPr/>
+        <p:nvPr/>
+      </p:nvGrpSpPr>
+      <p:grpSpPr>
+        <a:xfrm>
+          <a:off x="0" y="0"/>
+          <a:ext cx="0" cy="0"/>
+          <a:chOff x="0" y="0"/>
+          <a:chExt cx="0" cy="0"/>
+        </a:xfrm>
+      </p:grpSpPr>
+      <p:sp>
+        <p:nvSpPr>
+          <p:cNvPr id="2" name="Title 1"/>
+          <p:cNvSpPr>
+            <a:spLocks noGrp="1"/>
+          </p:cNvSpPr>
+          <p:nvPr>
+            <p:ph type="ctrTitle"/>
+          </p:nvPr>
+        </p:nvSpPr>
+        <p:spPr>
+          <a:xfrm>
+            <a:off x="533400" y="1"/>
+            <a:ext cx="7772400" cy="1143000"/>
+          </a:xfrm>
+        </p:spPr>
+        <p:txBody>
+          <a:bodyPr/>
+          <a:lstStyle/>
+          <a:p>
+            <a:r>
+              <a:rPr lang="en-US" dirty="0" smtClean="0"/>
+              <a:t>Strategy</a:t>
+            </a:r>
+            <a:endParaRPr lang="en-US" dirty="0"/>
+          </a:p>
+        </p:txBody>
+      </p:sp>
+      <p:pic>
+        <p:nvPicPr>
+          <p:cNvPr id="4098" name="Picture 2"/>
+          <p:cNvPicPr>
+            <a:picLocks noChangeAspect="1" noChangeArrowheads="1"/>
+          </p:cNvPicPr>
+          <p:nvPr/>
+        </p:nvPicPr>
+        <p:blipFill>
+          <a:blip r:embed="rId2" cstate="print"/>
+          <a:srcRect/>
+          <a:stretch>
+            <a:fillRect/>
+          </a:stretch>
+        </p:blipFill>
+        <p:spPr bwMode="auto">
+          <a:xfrm>
+            <a:off x="0" y="1066800"/>
+            <a:ext cx="8896350" cy="5153025"/>
+          </a:xfrm>
+          <a:prstGeom prst="rect">
+            <a:avLst/>
+          </a:prstGeom>
+          <a:noFill/>
+          <a:ln w="9525">
+            <a:noFill/>
+            <a:miter lim="800000"/>
+            <a:headEnd/>
+            <a:tailEnd/>
+          </a:ln>
+        </p:spPr>
+      </p:pic>
+    </p:spTree>
+  </p:cSld>
+  <p:clrMapOvr>
+    <a:masterClrMapping/>
+  </p:clrMapOvr>
+</p:sld>
+</file>
+
+<file path=ppt/slides/slide13.xml><?xml version="1.0" encoding="utf-8"?>
+<p:sld xmlns:a="http://schemas.openxmlformats.org/drawingml/2006/main" xmlns:r="http://schemas.openxmlformats.org/officeDocument/2006/relationships" xmlns:p="http://schemas.openxmlformats.org/presentationml/2006/main">
+  <p:cSld>
+    <p:spTree>
+      <p:nvGrpSpPr>
+        <p:cNvPr id="1" name=""/>
+        <p:cNvGrpSpPr/>
+        <p:nvPr/>
+      </p:nvGrpSpPr>
+      <p:grpSpPr>
+        <a:xfrm>
+          <a:off x="0" y="0"/>
+          <a:ext cx="0" cy="0"/>
+          <a:chOff x="0" y="0"/>
+          <a:chExt cx="0" cy="0"/>
+        </a:xfrm>
+      </p:grpSpPr>
+      <p:sp>
+        <p:nvSpPr>
+          <p:cNvPr id="2" name="Title 1"/>
+          <p:cNvSpPr>
+            <a:spLocks noGrp="1"/>
+          </p:cNvSpPr>
+          <p:nvPr>
+            <p:ph type="ctrTitle"/>
+          </p:nvPr>
+        </p:nvSpPr>
+        <p:spPr>
+          <a:xfrm>
+            <a:off x="533400" y="1"/>
+            <a:ext cx="7772400" cy="1143000"/>
+          </a:xfrm>
+        </p:spPr>
+        <p:txBody>
+          <a:bodyPr/>
+          <a:lstStyle/>
+          <a:p>
+            <a:r>
+              <a:rPr lang="en-US" dirty="0" smtClean="0"/>
+              <a:t>Template</a:t>
+            </a:r>
+            <a:endParaRPr lang="en-US" dirty="0"/>
+          </a:p>
+        </p:txBody>
+      </p:sp>
+      <p:pic>
+        <p:nvPicPr>
+          <p:cNvPr id="5122" name="Picture 2"/>
+          <p:cNvPicPr>
+            <a:picLocks noChangeAspect="1" noChangeArrowheads="1"/>
+          </p:cNvPicPr>
+          <p:nvPr/>
+        </p:nvPicPr>
+        <p:blipFill>
+          <a:blip r:embed="rId2" cstate="print"/>
+          <a:srcRect/>
+          <a:stretch>
+            <a:fillRect/>
+          </a:stretch>
+        </p:blipFill>
+        <p:spPr bwMode="auto">
+          <a:xfrm>
+            <a:off x="152400" y="990600"/>
+            <a:ext cx="8858250" cy="5567363"/>
+          </a:xfrm>
+          <a:prstGeom prst="rect">
+            <a:avLst/>
+          </a:prstGeom>
+          <a:noFill/>
+          <a:ln w="9525">
+            <a:noFill/>
+            <a:miter lim="800000"/>
+            <a:headEnd/>
+            <a:tailEnd/>
+          </a:ln>
+        </p:spPr>
+      </p:pic>
+    </p:spTree>
+  </p:cSld>
+  <p:clrMapOvr>
+    <a:masterClrMapping/>
+  </p:clrMapOvr>
+</p:sld>
+</file>
+
+<file path=ppt/slides/slide14.xml><?xml version="1.0" encoding="utf-8"?>
+<p:sld xmlns:a="http://schemas.openxmlformats.org/drawingml/2006/main" xmlns:r="http://schemas.openxmlformats.org/officeDocument/2006/relationships" xmlns:p="http://schemas.openxmlformats.org/presentationml/2006/main">
+  <p:cSld>
+    <p:spTree>
+      <p:nvGrpSpPr>
+        <p:cNvPr id="1" name=""/>
+        <p:cNvGrpSpPr/>
+        <p:nvPr/>
+      </p:nvGrpSpPr>
+      <p:grpSpPr>
+        <a:xfrm>
+          <a:off x="0" y="0"/>
+          <a:ext cx="0" cy="0"/>
+          <a:chOff x="0" y="0"/>
+          <a:chExt cx="0" cy="0"/>
+        </a:xfrm>
+      </p:grpSpPr>
+      <p:sp>
+        <p:nvSpPr>
+          <p:cNvPr id="2" name="Title 1"/>
+          <p:cNvSpPr>
+            <a:spLocks noGrp="1"/>
+          </p:cNvSpPr>
+          <p:nvPr>
+            <p:ph type="ctrTitle"/>
+          </p:nvPr>
+        </p:nvSpPr>
+        <p:spPr>
+          <a:xfrm>
+            <a:off x="609600" y="2514600"/>
+            <a:ext cx="7772400" cy="1143000"/>
+          </a:xfrm>
+        </p:spPr>
+        <p:txBody>
+          <a:bodyPr>
+            <a:normAutofit/>
+          </a:bodyPr>
+          <a:lstStyle/>
+          <a:p>
+            <a:r>
+              <a:rPr lang="en-US" dirty="0" smtClean="0"/>
+              <a:t>Structural Design Patterns</a:t>
+            </a:r>
+            <a:endParaRPr lang="en-US" dirty="0"/>
+          </a:p>
+        </p:txBody>
+      </p:sp>
+    </p:spTree>
+  </p:cSld>
+  <p:clrMapOvr>
+    <a:masterClrMapping/>
+  </p:clrMapOvr>
+</p:sld>
+</file>
+
+<file path=ppt/slides/slide15.xml><?xml version="1.0" encoding="utf-8"?>
+<p:sld xmlns:a="http://schemas.openxmlformats.org/drawingml/2006/main" xmlns:r="http://schemas.openxmlformats.org/officeDocument/2006/relationships" xmlns:p="http://schemas.openxmlformats.org/presentationml/2006/main">
+  <p:cSld>
+    <p:spTree>
+      <p:nvGrpSpPr>
+        <p:cNvPr id="1" name=""/>
+        <p:cNvGrpSpPr/>
+        <p:nvPr/>
+      </p:nvGrpSpPr>
+      <p:grpSpPr>
+        <a:xfrm>
+          <a:off x="0" y="0"/>
+          <a:ext cx="0" cy="0"/>
+          <a:chOff x="0" y="0"/>
+          <a:chExt cx="0" cy="0"/>
+        </a:xfrm>
+      </p:grpSpPr>
+      <p:sp>
+        <p:nvSpPr>
+          <p:cNvPr id="2" name="Title 1"/>
+          <p:cNvSpPr>
+            <a:spLocks noGrp="1"/>
+          </p:cNvSpPr>
+          <p:nvPr>
+            <p:ph type="ctrTitle"/>
+          </p:nvPr>
+        </p:nvSpPr>
+        <p:spPr>
+          <a:xfrm>
+            <a:off x="533400" y="1"/>
+            <a:ext cx="7772400" cy="1143000"/>
+          </a:xfrm>
+        </p:spPr>
+        <p:txBody>
+          <a:bodyPr/>
+          <a:lstStyle/>
+          <a:p>
+            <a:r>
+              <a:rPr lang="en-US" dirty="0" smtClean="0"/>
+              <a:t>Adapter</a:t>
+            </a:r>
+            <a:endParaRPr lang="en-US" dirty="0"/>
+          </a:p>
+        </p:txBody>
+      </p:sp>
+      <p:pic>
+        <p:nvPicPr>
+          <p:cNvPr id="6146" name="Picture 2"/>
+          <p:cNvPicPr>
+            <a:picLocks noChangeAspect="1" noChangeArrowheads="1"/>
+          </p:cNvPicPr>
+          <p:nvPr/>
+        </p:nvPicPr>
+        <p:blipFill>
+          <a:blip r:embed="rId2" cstate="print"/>
+          <a:srcRect/>
+          <a:stretch>
+            <a:fillRect/>
+          </a:stretch>
+        </p:blipFill>
+        <p:spPr bwMode="auto">
+          <a:xfrm>
+            <a:off x="190500" y="990600"/>
+            <a:ext cx="8953500" cy="5867400"/>
+          </a:xfrm>
+          <a:prstGeom prst="rect">
+            <a:avLst/>
+          </a:prstGeom>
+          <a:noFill/>
+          <a:ln w="9525">
+            <a:noFill/>
+            <a:miter lim="800000"/>
+            <a:headEnd/>
+            <a:tailEnd/>
+          </a:ln>
+        </p:spPr>
+      </p:pic>
+    </p:spTree>
+  </p:cSld>
+  <p:clrMapOvr>
+    <a:masterClrMapping/>
+  </p:clrMapOvr>
+</p:sld>
+</file>
+
+<file path=ppt/slides/slide16.xml><?xml version="1.0" encoding="utf-8"?>
+<p:sld xmlns:a="http://schemas.openxmlformats.org/drawingml/2006/main" xmlns:r="http://schemas.openxmlformats.org/officeDocument/2006/relationships" xmlns:p="http://schemas.openxmlformats.org/presentationml/2006/main">
+  <p:cSld>
+    <p:spTree>
+      <p:nvGrpSpPr>
+        <p:cNvPr id="1" name=""/>
+        <p:cNvGrpSpPr/>
+        <p:nvPr/>
+      </p:nvGrpSpPr>
+      <p:grpSpPr>
+        <a:xfrm>
+          <a:off x="0" y="0"/>
+          <a:ext cx="0" cy="0"/>
+          <a:chOff x="0" y="0"/>
+          <a:chExt cx="0" cy="0"/>
+        </a:xfrm>
+      </p:grpSpPr>
+      <p:sp>
+        <p:nvSpPr>
+          <p:cNvPr id="2" name="Title 1"/>
+          <p:cNvSpPr>
+            <a:spLocks noGrp="1"/>
+          </p:cNvSpPr>
+          <p:nvPr>
+            <p:ph type="ctrTitle"/>
+          </p:nvPr>
+        </p:nvSpPr>
+        <p:spPr>
+          <a:xfrm>
+            <a:off x="533400" y="1"/>
+            <a:ext cx="7772400" cy="1143000"/>
+          </a:xfrm>
+        </p:spPr>
+        <p:txBody>
+          <a:bodyPr/>
+          <a:lstStyle/>
+          <a:p>
+            <a:r>
+              <a:rPr lang="en-US" dirty="0" smtClean="0"/>
+              <a:t>Decorator</a:t>
+            </a:r>
+            <a:endParaRPr lang="en-US" dirty="0"/>
+          </a:p>
+        </p:txBody>
+      </p:sp>
+      <p:pic>
+        <p:nvPicPr>
+          <p:cNvPr id="7170" name="Picture 2"/>
+          <p:cNvPicPr>
+            <a:picLocks noChangeAspect="1" noChangeArrowheads="1"/>
+          </p:cNvPicPr>
+          <p:nvPr/>
+        </p:nvPicPr>
+        <p:blipFill>
+          <a:blip r:embed="rId2" cstate="print"/>
+          <a:srcRect/>
+          <a:stretch>
+            <a:fillRect/>
+          </a:stretch>
+        </p:blipFill>
+        <p:spPr bwMode="auto">
+          <a:xfrm>
+            <a:off x="0" y="977043"/>
+            <a:ext cx="9144000" cy="5880957"/>
+          </a:xfrm>
+          <a:prstGeom prst="rect">
+            <a:avLst/>
+          </a:prstGeom>
+          <a:noFill/>
+          <a:ln w="9525">
+            <a:noFill/>
+            <a:miter lim="800000"/>
+            <a:headEnd/>
+            <a:tailEnd/>
+          </a:ln>
+        </p:spPr>
+      </p:pic>
+    </p:spTree>
+  </p:cSld>
+  <p:clrMapOvr>
+    <a:masterClrMapping/>
+  </p:clrMapOvr>
+</p:sld>
+</file>
+
+<file path=ppt/slides/slide17.xml><?xml version="1.0" encoding="utf-8"?>
+<p:sld xmlns:a="http://schemas.openxmlformats.org/drawingml/2006/main" xmlns:r="http://schemas.openxmlformats.org/officeDocument/2006/relationships" xmlns:p="http://schemas.openxmlformats.org/presentationml/2006/main">
+  <p:cSld>
+    <p:spTree>
+      <p:nvGrpSpPr>
+        <p:cNvPr id="1" name=""/>
+        <p:cNvGrpSpPr/>
+        <p:nvPr/>
+      </p:nvGrpSpPr>
+      <p:grpSpPr>
+        <a:xfrm>
+          <a:off x="0" y="0"/>
+          <a:ext cx="0" cy="0"/>
+          <a:chOff x="0" y="0"/>
+          <a:chExt cx="0" cy="0"/>
+        </a:xfrm>
+      </p:grpSpPr>
+      <p:sp>
+        <p:nvSpPr>
+          <p:cNvPr id="2" name="Title 1"/>
+          <p:cNvSpPr>
+            <a:spLocks noGrp="1"/>
+          </p:cNvSpPr>
+          <p:nvPr>
+            <p:ph type="ctrTitle"/>
+          </p:nvPr>
+        </p:nvSpPr>
+        <p:spPr>
+          <a:xfrm>
+            <a:off x="533400" y="1"/>
+            <a:ext cx="7772400" cy="1143000"/>
+          </a:xfrm>
+        </p:spPr>
+        <p:txBody>
+          <a:bodyPr/>
+          <a:lstStyle/>
+          <a:p>
+            <a:r>
+              <a:rPr lang="en-US" dirty="0" smtClean="0"/>
+              <a:t>Façade - Service</a:t>
+            </a:r>
+            <a:endParaRPr lang="en-US" dirty="0"/>
+          </a:p>
+        </p:txBody>
+      </p:sp>
+      <p:pic>
+        <p:nvPicPr>
+          <p:cNvPr id="8194" name="Picture 2"/>
+          <p:cNvPicPr>
+            <a:picLocks noChangeAspect="1" noChangeArrowheads="1"/>
+          </p:cNvPicPr>
+          <p:nvPr/>
+        </p:nvPicPr>
+        <p:blipFill>
+          <a:blip r:embed="rId2" cstate="print"/>
+          <a:srcRect/>
+          <a:stretch>
+            <a:fillRect/>
+          </a:stretch>
+        </p:blipFill>
+        <p:spPr bwMode="auto">
+          <a:xfrm>
+            <a:off x="180975" y="1062038"/>
+            <a:ext cx="8782050" cy="4733925"/>
+          </a:xfrm>
+          <a:prstGeom prst="rect">
+            <a:avLst/>
+          </a:prstGeom>
+          <a:noFill/>
+          <a:ln w="9525">
+            <a:noFill/>
+            <a:miter lim="800000"/>
+            <a:headEnd/>
+            <a:tailEnd/>
+          </a:ln>
+        </p:spPr>
+      </p:pic>
+    </p:spTree>
+  </p:cSld>
+  <p:clrMapOvr>
+    <a:masterClrMapping/>
+  </p:clrMapOvr>
+</p:sld>
+</file>
+
+<file path=ppt/slides/slide18.xml><?xml version="1.0" encoding="utf-8"?>
+<p:sld xmlns:a="http://schemas.openxmlformats.org/drawingml/2006/main" xmlns:r="http://schemas.openxmlformats.org/officeDocument/2006/relationships" xmlns:p="http://schemas.openxmlformats.org/presentationml/2006/main">
+  <p:cSld>
+    <p:spTree>
+      <p:nvGrpSpPr>
+        <p:cNvPr id="1" name=""/>
+        <p:cNvGrpSpPr/>
+        <p:nvPr/>
+      </p:nvGrpSpPr>
+      <p:grpSpPr>
+        <a:xfrm>
+          <a:off x="0" y="0"/>
+          <a:ext cx="0" cy="0"/>
+          <a:chOff x="0" y="0"/>
+          <a:chExt cx="0" cy="0"/>
+        </a:xfrm>
+      </p:grpSpPr>
+      <p:sp>
+        <p:nvSpPr>
+          <p:cNvPr id="2" name="Title 1"/>
+          <p:cNvSpPr>
+            <a:spLocks noGrp="1"/>
+          </p:cNvSpPr>
+          <p:nvPr>
+            <p:ph type="ctrTitle"/>
+          </p:nvPr>
+        </p:nvSpPr>
+        <p:spPr>
+          <a:xfrm>
+            <a:off x="533400" y="1"/>
+            <a:ext cx="7772400" cy="1143000"/>
+          </a:xfrm>
+        </p:spPr>
+        <p:txBody>
+          <a:bodyPr/>
+          <a:lstStyle/>
+          <a:p>
+            <a:r>
+              <a:rPr lang="en-US" dirty="0" smtClean="0"/>
+              <a:t>Proxy</a:t>
+            </a:r>
+            <a:endParaRPr lang="en-US" dirty="0"/>
+          </a:p>
+        </p:txBody>
+      </p:sp>
+      <p:pic>
+        <p:nvPicPr>
+          <p:cNvPr id="9218" name="Picture 2"/>
+          <p:cNvPicPr>
+            <a:picLocks noChangeAspect="1" noChangeArrowheads="1"/>
+          </p:cNvPicPr>
+          <p:nvPr/>
+        </p:nvPicPr>
+        <p:blipFill>
+          <a:blip r:embed="rId2" cstate="print"/>
+          <a:srcRect/>
+          <a:stretch>
+            <a:fillRect/>
+          </a:stretch>
+        </p:blipFill>
+        <p:spPr bwMode="auto">
+          <a:xfrm>
+            <a:off x="204788" y="1457325"/>
+            <a:ext cx="8734425" cy="3943350"/>
+          </a:xfrm>
+          <a:prstGeom prst="rect">
+            <a:avLst/>
+          </a:prstGeom>
+          <a:noFill/>
+          <a:ln w="9525">
+            <a:noFill/>
+            <a:miter lim="800000"/>
+            <a:headEnd/>
+            <a:tailEnd/>
+          </a:ln>
+        </p:spPr>
+      </p:pic>
+    </p:spTree>
+  </p:cSld>
+  <p:clrMapOvr>
+    <a:masterClrMapping/>
+  </p:clrMapOvr>
+</p:sld>
+</file>
+
+<file path=ppt/slides/slide19.xml><?xml version="1.0" encoding="utf-8"?>
+<p:sld xmlns:a="http://schemas.openxmlformats.org/drawingml/2006/main" xmlns:r="http://schemas.openxmlformats.org/officeDocument/2006/relationships" xmlns:p="http://schemas.openxmlformats.org/presentationml/2006/main">
+  <p:cSld>
+    <p:spTree>
+      <p:nvGrpSpPr>
+        <p:cNvPr id="1" name=""/>
+        <p:cNvGrpSpPr/>
+        <p:nvPr/>
+      </p:nvGrpSpPr>
+      <p:grpSpPr>
+        <a:xfrm>
+          <a:off x="0" y="0"/>
+          <a:ext cx="0" cy="0"/>
+          <a:chOff x="0" y="0"/>
+          <a:chExt cx="0" cy="0"/>
+        </a:xfrm>
+      </p:grpSpPr>
+      <p:sp>
+        <p:nvSpPr>
+          <p:cNvPr id="2" name="Title 1"/>
+          <p:cNvSpPr>
+            <a:spLocks noGrp="1"/>
+          </p:cNvSpPr>
+          <p:nvPr>
+            <p:ph type="ctrTitle"/>
+          </p:nvPr>
+        </p:nvSpPr>
+        <p:spPr>
+          <a:xfrm>
+            <a:off x="609600" y="2514600"/>
+            <a:ext cx="7772400" cy="1143000"/>
+          </a:xfrm>
+        </p:spPr>
+        <p:txBody>
+          <a:bodyPr>
+            <a:normAutofit/>
+          </a:bodyPr>
+          <a:lstStyle/>
+          <a:p>
+            <a:r>
+              <a:rPr lang="en-US" dirty="0" smtClean="0"/>
+              <a:t>Java EE</a:t>
+            </a:r>
+            <a:endParaRPr lang="en-US" dirty="0"/>
+          </a:p>
+        </p:txBody>
+      </p:sp>
+    </p:spTree>
+  </p:cSld>
+  <p:clrMapOvr>
+    <a:masterClrMapping/>
+  </p:clrMapOvr>
+</p:sld>
+</file>
+
 <file path=ppt/slides/slide2.xml><?xml version="1.0" encoding="utf-8"?>
 <p:sld xmlns:a="http://schemas.openxmlformats.org/drawingml/2006/main" xmlns:r="http://schemas.openxmlformats.org/officeDocument/2006/relationships" xmlns:p="http://schemas.openxmlformats.org/presentationml/2006/main">
   <p:cSld>
@@ -3180,6 +3986,454 @@
           </a:ln>
         </p:spPr>
       </p:pic>
+    </p:spTree>
+  </p:cSld>
+  <p:clrMapOvr>
+    <a:masterClrMapping/>
+  </p:clrMapOvr>
+</p:sld>
+</file>
+
+<file path=ppt/slides/slide20.xml><?xml version="1.0" encoding="utf-8"?>
+<p:sld xmlns:a="http://schemas.openxmlformats.org/drawingml/2006/main" xmlns:r="http://schemas.openxmlformats.org/officeDocument/2006/relationships" xmlns:p="http://schemas.openxmlformats.org/presentationml/2006/main">
+  <p:cSld>
+    <p:spTree>
+      <p:nvGrpSpPr>
+        <p:cNvPr id="1" name=""/>
+        <p:cNvGrpSpPr/>
+        <p:nvPr/>
+      </p:nvGrpSpPr>
+      <p:grpSpPr>
+        <a:xfrm>
+          <a:off x="0" y="0"/>
+          <a:ext cx="0" cy="0"/>
+          <a:chOff x="0" y="0"/>
+          <a:chExt cx="0" cy="0"/>
+        </a:xfrm>
+      </p:grpSpPr>
+      <p:sp>
+        <p:nvSpPr>
+          <p:cNvPr id="2" name="Title 1"/>
+          <p:cNvSpPr>
+            <a:spLocks noGrp="1"/>
+          </p:cNvSpPr>
+          <p:nvPr>
+            <p:ph type="ctrTitle"/>
+          </p:nvPr>
+        </p:nvSpPr>
+        <p:spPr>
+          <a:xfrm>
+            <a:off x="533400" y="1"/>
+            <a:ext cx="7772400" cy="1143000"/>
+          </a:xfrm>
+        </p:spPr>
+        <p:txBody>
+          <a:bodyPr/>
+          <a:lstStyle/>
+          <a:p>
+            <a:r>
+              <a:rPr lang="en-US" dirty="0" smtClean="0"/>
+              <a:t>Model – View - Controller</a:t>
+            </a:r>
+            <a:endParaRPr lang="en-US" dirty="0"/>
+          </a:p>
+        </p:txBody>
+      </p:sp>
+      <p:pic>
+        <p:nvPicPr>
+          <p:cNvPr id="10242" name="Picture 2"/>
+          <p:cNvPicPr>
+            <a:picLocks noChangeAspect="1" noChangeArrowheads="1"/>
+          </p:cNvPicPr>
+          <p:nvPr/>
+        </p:nvPicPr>
+        <p:blipFill>
+          <a:blip r:embed="rId2" cstate="print"/>
+          <a:srcRect/>
+          <a:stretch>
+            <a:fillRect/>
+          </a:stretch>
+        </p:blipFill>
+        <p:spPr bwMode="auto">
+          <a:xfrm>
+            <a:off x="247650" y="876300"/>
+            <a:ext cx="8896350" cy="5981700"/>
+          </a:xfrm>
+          <a:prstGeom prst="rect">
+            <a:avLst/>
+          </a:prstGeom>
+          <a:noFill/>
+          <a:ln w="9525">
+            <a:noFill/>
+            <a:miter lim="800000"/>
+            <a:headEnd/>
+            <a:tailEnd/>
+          </a:ln>
+        </p:spPr>
+      </p:pic>
+    </p:spTree>
+  </p:cSld>
+  <p:clrMapOvr>
+    <a:masterClrMapping/>
+  </p:clrMapOvr>
+</p:sld>
+</file>
+
+<file path=ppt/slides/slide21.xml><?xml version="1.0" encoding="utf-8"?>
+<p:sld xmlns:a="http://schemas.openxmlformats.org/drawingml/2006/main" xmlns:r="http://schemas.openxmlformats.org/officeDocument/2006/relationships" xmlns:p="http://schemas.openxmlformats.org/presentationml/2006/main">
+  <p:cSld>
+    <p:spTree>
+      <p:nvGrpSpPr>
+        <p:cNvPr id="1" name=""/>
+        <p:cNvGrpSpPr/>
+        <p:nvPr/>
+      </p:nvGrpSpPr>
+      <p:grpSpPr>
+        <a:xfrm>
+          <a:off x="0" y="0"/>
+          <a:ext cx="0" cy="0"/>
+          <a:chOff x="0" y="0"/>
+          <a:chExt cx="0" cy="0"/>
+        </a:xfrm>
+      </p:grpSpPr>
+      <p:sp>
+        <p:nvSpPr>
+          <p:cNvPr id="2" name="Title 1"/>
+          <p:cNvSpPr>
+            <a:spLocks noGrp="1"/>
+          </p:cNvSpPr>
+          <p:nvPr>
+            <p:ph type="ctrTitle"/>
+          </p:nvPr>
+        </p:nvSpPr>
+        <p:spPr>
+          <a:xfrm>
+            <a:off x="533400" y="1"/>
+            <a:ext cx="7772400" cy="1143000"/>
+          </a:xfrm>
+        </p:spPr>
+        <p:txBody>
+          <a:bodyPr>
+            <a:normAutofit fontScale="90000"/>
+          </a:bodyPr>
+          <a:lstStyle/>
+          <a:p>
+            <a:r>
+              <a:rPr lang="en-US" dirty="0" smtClean="0"/>
+              <a:t>Model – View – Controller - Example</a:t>
+            </a:r>
+            <a:endParaRPr lang="en-US" dirty="0"/>
+          </a:p>
+        </p:txBody>
+      </p:sp>
+      <p:pic>
+        <p:nvPicPr>
+          <p:cNvPr id="13314" name="Picture 2"/>
+          <p:cNvPicPr>
+            <a:picLocks noChangeAspect="1" noChangeArrowheads="1"/>
+          </p:cNvPicPr>
+          <p:nvPr/>
+        </p:nvPicPr>
+        <p:blipFill>
+          <a:blip r:embed="rId2" cstate="print"/>
+          <a:srcRect/>
+          <a:stretch>
+            <a:fillRect/>
+          </a:stretch>
+        </p:blipFill>
+        <p:spPr bwMode="auto">
+          <a:xfrm>
+            <a:off x="228600" y="838200"/>
+            <a:ext cx="8667750" cy="5819775"/>
+          </a:xfrm>
+          <a:prstGeom prst="rect">
+            <a:avLst/>
+          </a:prstGeom>
+          <a:noFill/>
+          <a:ln w="9525">
+            <a:noFill/>
+            <a:miter lim="800000"/>
+            <a:headEnd/>
+            <a:tailEnd/>
+          </a:ln>
+        </p:spPr>
+      </p:pic>
+    </p:spTree>
+  </p:cSld>
+  <p:clrMapOvr>
+    <a:masterClrMapping/>
+  </p:clrMapOvr>
+</p:sld>
+</file>
+
+<file path=ppt/slides/slide22.xml><?xml version="1.0" encoding="utf-8"?>
+<p:sld xmlns:a="http://schemas.openxmlformats.org/drawingml/2006/main" xmlns:r="http://schemas.openxmlformats.org/officeDocument/2006/relationships" xmlns:p="http://schemas.openxmlformats.org/presentationml/2006/main">
+  <p:cSld>
+    <p:spTree>
+      <p:nvGrpSpPr>
+        <p:cNvPr id="1" name=""/>
+        <p:cNvGrpSpPr/>
+        <p:nvPr/>
+      </p:nvGrpSpPr>
+      <p:grpSpPr>
+        <a:xfrm>
+          <a:off x="0" y="0"/>
+          <a:ext cx="0" cy="0"/>
+          <a:chOff x="0" y="0"/>
+          <a:chExt cx="0" cy="0"/>
+        </a:xfrm>
+      </p:grpSpPr>
+      <p:sp>
+        <p:nvSpPr>
+          <p:cNvPr id="2" name="Title 1"/>
+          <p:cNvSpPr>
+            <a:spLocks noGrp="1"/>
+          </p:cNvSpPr>
+          <p:nvPr>
+            <p:ph type="ctrTitle"/>
+          </p:nvPr>
+        </p:nvSpPr>
+        <p:spPr>
+          <a:xfrm>
+            <a:off x="533400" y="1"/>
+            <a:ext cx="7772400" cy="1143000"/>
+          </a:xfrm>
+        </p:spPr>
+        <p:txBody>
+          <a:bodyPr/>
+          <a:lstStyle/>
+          <a:p>
+            <a:r>
+              <a:rPr lang="en-US" dirty="0" smtClean="0"/>
+              <a:t>Data Access Object</a:t>
+            </a:r>
+            <a:endParaRPr lang="en-US" dirty="0"/>
+          </a:p>
+        </p:txBody>
+      </p:sp>
+      <p:pic>
+        <p:nvPicPr>
+          <p:cNvPr id="11266" name="Picture 2"/>
+          <p:cNvPicPr>
+            <a:picLocks noChangeAspect="1" noChangeArrowheads="1"/>
+          </p:cNvPicPr>
+          <p:nvPr/>
+        </p:nvPicPr>
+        <p:blipFill>
+          <a:blip r:embed="rId2" cstate="print"/>
+          <a:srcRect/>
+          <a:stretch>
+            <a:fillRect/>
+          </a:stretch>
+        </p:blipFill>
+        <p:spPr bwMode="auto">
+          <a:xfrm>
+            <a:off x="152400" y="990600"/>
+            <a:ext cx="8801100" cy="5867400"/>
+          </a:xfrm>
+          <a:prstGeom prst="rect">
+            <a:avLst/>
+          </a:prstGeom>
+          <a:noFill/>
+          <a:ln w="9525">
+            <a:noFill/>
+            <a:miter lim="800000"/>
+            <a:headEnd/>
+            <a:tailEnd/>
+          </a:ln>
+        </p:spPr>
+      </p:pic>
+    </p:spTree>
+  </p:cSld>
+  <p:clrMapOvr>
+    <a:masterClrMapping/>
+  </p:clrMapOvr>
+</p:sld>
+</file>
+
+<file path=ppt/slides/slide23.xml><?xml version="1.0" encoding="utf-8"?>
+<p:sld xmlns:a="http://schemas.openxmlformats.org/drawingml/2006/main" xmlns:r="http://schemas.openxmlformats.org/officeDocument/2006/relationships" xmlns:p="http://schemas.openxmlformats.org/presentationml/2006/main">
+  <p:cSld>
+    <p:spTree>
+      <p:nvGrpSpPr>
+        <p:cNvPr id="1" name=""/>
+        <p:cNvGrpSpPr/>
+        <p:nvPr/>
+      </p:nvGrpSpPr>
+      <p:grpSpPr>
+        <a:xfrm>
+          <a:off x="0" y="0"/>
+          <a:ext cx="0" cy="0"/>
+          <a:chOff x="0" y="0"/>
+          <a:chExt cx="0" cy="0"/>
+        </a:xfrm>
+      </p:grpSpPr>
+      <p:sp>
+        <p:nvSpPr>
+          <p:cNvPr id="2" name="Title 1"/>
+          <p:cNvSpPr>
+            <a:spLocks noGrp="1"/>
+          </p:cNvSpPr>
+          <p:nvPr>
+            <p:ph type="ctrTitle"/>
+          </p:nvPr>
+        </p:nvSpPr>
+        <p:spPr>
+          <a:xfrm>
+            <a:off x="533400" y="1"/>
+            <a:ext cx="7772400" cy="1143000"/>
+          </a:xfrm>
+        </p:spPr>
+        <p:txBody>
+          <a:bodyPr/>
+          <a:lstStyle/>
+          <a:p>
+            <a:r>
+              <a:rPr lang="en-US" dirty="0" smtClean="0"/>
+              <a:t>Data Access Object - Example</a:t>
+            </a:r>
+            <a:endParaRPr lang="en-US" dirty="0"/>
+          </a:p>
+        </p:txBody>
+      </p:sp>
+    </p:spTree>
+  </p:cSld>
+  <p:clrMapOvr>
+    <a:masterClrMapping/>
+  </p:clrMapOvr>
+</p:sld>
+</file>
+
+<file path=ppt/slides/slide24.xml><?xml version="1.0" encoding="utf-8"?>
+<p:sld xmlns:a="http://schemas.openxmlformats.org/drawingml/2006/main" xmlns:r="http://schemas.openxmlformats.org/officeDocument/2006/relationships" xmlns:p="http://schemas.openxmlformats.org/presentationml/2006/main">
+  <p:cSld>
+    <p:spTree>
+      <p:nvGrpSpPr>
+        <p:cNvPr id="1" name=""/>
+        <p:cNvGrpSpPr/>
+        <p:nvPr/>
+      </p:nvGrpSpPr>
+      <p:grpSpPr>
+        <a:xfrm>
+          <a:off x="0" y="0"/>
+          <a:ext cx="0" cy="0"/>
+          <a:chOff x="0" y="0"/>
+          <a:chExt cx="0" cy="0"/>
+        </a:xfrm>
+      </p:grpSpPr>
+      <p:sp>
+        <p:nvSpPr>
+          <p:cNvPr id="2" name="Title 1"/>
+          <p:cNvSpPr>
+            <a:spLocks noGrp="1"/>
+          </p:cNvSpPr>
+          <p:nvPr>
+            <p:ph type="ctrTitle"/>
+          </p:nvPr>
+        </p:nvSpPr>
+        <p:spPr>
+          <a:xfrm>
+            <a:off x="533400" y="1"/>
+            <a:ext cx="7772400" cy="1143000"/>
+          </a:xfrm>
+        </p:spPr>
+        <p:txBody>
+          <a:bodyPr/>
+          <a:lstStyle/>
+          <a:p>
+            <a:r>
+              <a:rPr lang="en-US" dirty="0" smtClean="0"/>
+              <a:t>Transfer Object</a:t>
+            </a:r>
+            <a:endParaRPr lang="en-US" dirty="0"/>
+          </a:p>
+        </p:txBody>
+      </p:sp>
+      <p:pic>
+        <p:nvPicPr>
+          <p:cNvPr id="12290" name="Picture 2"/>
+          <p:cNvPicPr>
+            <a:picLocks noChangeAspect="1" noChangeArrowheads="1"/>
+          </p:cNvPicPr>
+          <p:nvPr/>
+        </p:nvPicPr>
+        <p:blipFill>
+          <a:blip r:embed="rId2" cstate="print"/>
+          <a:srcRect/>
+          <a:stretch>
+            <a:fillRect/>
+          </a:stretch>
+        </p:blipFill>
+        <p:spPr bwMode="auto">
+          <a:xfrm>
+            <a:off x="1600200" y="990600"/>
+            <a:ext cx="6162675" cy="5629275"/>
+          </a:xfrm>
+          <a:prstGeom prst="rect">
+            <a:avLst/>
+          </a:prstGeom>
+          <a:noFill/>
+          <a:ln w="9525">
+            <a:noFill/>
+            <a:miter lim="800000"/>
+            <a:headEnd/>
+            <a:tailEnd/>
+          </a:ln>
+        </p:spPr>
+      </p:pic>
+    </p:spTree>
+  </p:cSld>
+  <p:clrMapOvr>
+    <a:masterClrMapping/>
+  </p:clrMapOvr>
+</p:sld>
+</file>
+
+<file path=ppt/slides/slide25.xml><?xml version="1.0" encoding="utf-8"?>
+<p:sld xmlns:a="http://schemas.openxmlformats.org/drawingml/2006/main" xmlns:r="http://schemas.openxmlformats.org/officeDocument/2006/relationships" xmlns:p="http://schemas.openxmlformats.org/presentationml/2006/main">
+  <p:cSld>
+    <p:spTree>
+      <p:nvGrpSpPr>
+        <p:cNvPr id="1" name=""/>
+        <p:cNvGrpSpPr/>
+        <p:nvPr/>
+      </p:nvGrpSpPr>
+      <p:grpSpPr>
+        <a:xfrm>
+          <a:off x="0" y="0"/>
+          <a:ext cx="0" cy="0"/>
+          <a:chOff x="0" y="0"/>
+          <a:chExt cx="0" cy="0"/>
+        </a:xfrm>
+      </p:grpSpPr>
+      <p:sp>
+        <p:nvSpPr>
+          <p:cNvPr id="2" name="Title 1"/>
+          <p:cNvSpPr>
+            <a:spLocks noGrp="1"/>
+          </p:cNvSpPr>
+          <p:nvPr>
+            <p:ph type="ctrTitle"/>
+          </p:nvPr>
+        </p:nvSpPr>
+        <p:spPr>
+          <a:xfrm>
+            <a:off x="533400" y="1"/>
+            <a:ext cx="7772400" cy="1143000"/>
+          </a:xfrm>
+        </p:spPr>
+        <p:txBody>
+          <a:bodyPr/>
+          <a:lstStyle/>
+          <a:p>
+            <a:r>
+              <a:rPr lang="en-US" dirty="0" smtClean="0"/>
+              <a:t>Transfer Object - Example</a:t>
+            </a:r>
+            <a:endParaRPr lang="en-US" dirty="0"/>
+          </a:p>
+        </p:txBody>
+      </p:sp>
     </p:spTree>
   </p:cSld>
   <p:clrMapOvr>
@@ -3626,11 +4880,7 @@
             </a:r>
             <a:r>
               <a:rPr lang="en-US" smtClean="0"/>
-              <a:t>of </a:t>
-            </a:r>
-            <a:r>
-              <a:rPr lang="en-US" smtClean="0"/>
-              <a:t>Responsibility</a:t>
+              <a:t>of Responsibility</a:t>
             </a:r>
             <a:endParaRPr lang="en-US" dirty="0"/>
           </a:p>
@@ -3638,7 +4888,7 @@
       </p:sp>
       <p:pic>
         <p:nvPicPr>
-          <p:cNvPr id="5122" name="Picture 2"/>
+          <p:cNvPr id="6146" name="Picture 2"/>
           <p:cNvPicPr>
             <a:picLocks noChangeAspect="1" noChangeArrowheads="1"/>
           </p:cNvPicPr>
@@ -3653,39 +4903,7 @@
         </p:blipFill>
         <p:spPr bwMode="auto">
           <a:xfrm>
-            <a:off x="0" y="990600"/>
-            <a:ext cx="8982075" cy="5867400"/>
-          </a:xfrm>
-          <a:prstGeom prst="rect">
-            <a:avLst/>
-          </a:prstGeom>
-          <a:noFill/>
-          <a:ln w="9525">
-            <a:noFill/>
-            <a:miter lim="800000"/>
-            <a:headEnd/>
-            <a:tailEnd/>
-          </a:ln>
-        </p:spPr>
-      </p:pic>
-      <p:pic>
-        <p:nvPicPr>
-          <p:cNvPr id="6146" name="Picture 2"/>
-          <p:cNvPicPr>
-            <a:picLocks noChangeAspect="1" noChangeArrowheads="1"/>
-          </p:cNvPicPr>
-          <p:nvPr/>
-        </p:nvPicPr>
-        <p:blipFill>
-          <a:blip r:embed="rId3" cstate="print"/>
-          <a:srcRect/>
-          <a:stretch>
-            <a:fillRect/>
-          </a:stretch>
-        </p:blipFill>
-        <p:spPr bwMode="auto">
-          <a:xfrm>
-            <a:off x="57150" y="914400"/>
+            <a:off x="0" y="914400"/>
             <a:ext cx="9029700" cy="5505450"/>
           </a:xfrm>
           <a:prstGeom prst="rect">
@@ -3737,24 +4955,54 @@
         </p:nvSpPr>
         <p:spPr>
           <a:xfrm>
-            <a:off x="609600" y="2514600"/>
+            <a:off x="533400" y="1"/>
             <a:ext cx="7772400" cy="1143000"/>
           </a:xfrm>
         </p:spPr>
         <p:txBody>
-          <a:bodyPr>
-            <a:normAutofit/>
-          </a:bodyPr>
+          <a:bodyPr/>
           <a:lstStyle/>
           <a:p>
             <a:r>
               <a:rPr lang="en-US" dirty="0" smtClean="0"/>
-              <a:t>Structural Design Patterns</a:t>
+              <a:t>Command</a:t>
             </a:r>
             <a:endParaRPr lang="en-US" dirty="0"/>
           </a:p>
         </p:txBody>
       </p:sp>
+      <p:pic>
+        <p:nvPicPr>
+          <p:cNvPr id="1026" name="Picture 2"/>
+          <p:cNvPicPr>
+            <a:picLocks noChangeAspect="1" noChangeArrowheads="1"/>
+          </p:cNvPicPr>
+          <p:nvPr/>
+        </p:nvPicPr>
+        <p:blipFill>
+          <a:blip r:embed="rId2" cstate="print"/>
+          <a:srcRect/>
+          <a:stretch>
+            <a:fillRect/>
+          </a:stretch>
+        </p:blipFill>
+        <p:spPr bwMode="auto">
+          <a:xfrm>
+            <a:off x="609600" y="762000"/>
+            <a:ext cx="7715250" cy="5928199"/>
+          </a:xfrm>
+          <a:prstGeom prst="rect">
+            <a:avLst/>
+          </a:prstGeom>
+          <a:noFill/>
+          <a:ln w="9525">
+            <a:noFill/>
+            <a:miter lim="800000"/>
+            <a:headEnd/>
+            <a:tailEnd/>
+          </a:ln>
+        </p:spPr>
+      </p:pic>
     </p:spTree>
   </p:cSld>
   <p:clrMapOvr>

</xml_diff>

<commit_message>
curs 4 - design patterns + jdbc
</commit_message>
<xml_diff>
--- a/curs4/src/main/resources/DesignPatterns.pptx
+++ b/curs4/src/main/resources/DesignPatterns.pptx
@@ -27,9 +27,7 @@
     <p:sldId id="275" r:id="rId21"/>
     <p:sldId id="280" r:id="rId22"/>
     <p:sldId id="276" r:id="rId23"/>
-    <p:sldId id="279" r:id="rId24"/>
-    <p:sldId id="277" r:id="rId25"/>
-    <p:sldId id="278" r:id="rId26"/>
+    <p:sldId id="277" r:id="rId24"/>
   </p:sldIdLst>
   <p:sldSz cx="9144000" cy="6858000" type="screen4x3"/>
   <p:notesSz cx="6858000" cy="9144000"/>
@@ -313,7 +311,7 @@
             <a:fld id="{505251C1-60C0-424E-AF6B-263176C83A93}" type="datetimeFigureOut">
               <a:rPr lang="en-US" smtClean="0"/>
               <a:pPr/>
-              <a:t>05/11/16</a:t>
+              <a:t>10/11/16</a:t>
             </a:fld>
             <a:endParaRPr lang="en-US"/>
           </a:p>
@@ -480,7 +478,7 @@
             <a:fld id="{505251C1-60C0-424E-AF6B-263176C83A93}" type="datetimeFigureOut">
               <a:rPr lang="en-US" smtClean="0"/>
               <a:pPr/>
-              <a:t>05/11/16</a:t>
+              <a:t>10/11/16</a:t>
             </a:fld>
             <a:endParaRPr lang="en-US"/>
           </a:p>
@@ -657,7 +655,7 @@
             <a:fld id="{505251C1-60C0-424E-AF6B-263176C83A93}" type="datetimeFigureOut">
               <a:rPr lang="en-US" smtClean="0"/>
               <a:pPr/>
-              <a:t>05/11/16</a:t>
+              <a:t>10/11/16</a:t>
             </a:fld>
             <a:endParaRPr lang="en-US"/>
           </a:p>
@@ -824,7 +822,7 @@
             <a:fld id="{505251C1-60C0-424E-AF6B-263176C83A93}" type="datetimeFigureOut">
               <a:rPr lang="en-US" smtClean="0"/>
               <a:pPr/>
-              <a:t>05/11/16</a:t>
+              <a:t>10/11/16</a:t>
             </a:fld>
             <a:endParaRPr lang="en-US"/>
           </a:p>
@@ -1067,7 +1065,7 @@
             <a:fld id="{505251C1-60C0-424E-AF6B-263176C83A93}" type="datetimeFigureOut">
               <a:rPr lang="en-US" smtClean="0"/>
               <a:pPr/>
-              <a:t>05/11/16</a:t>
+              <a:t>10/11/16</a:t>
             </a:fld>
             <a:endParaRPr lang="en-US"/>
           </a:p>
@@ -1352,7 +1350,7 @@
             <a:fld id="{505251C1-60C0-424E-AF6B-263176C83A93}" type="datetimeFigureOut">
               <a:rPr lang="en-US" smtClean="0"/>
               <a:pPr/>
-              <a:t>05/11/16</a:t>
+              <a:t>10/11/16</a:t>
             </a:fld>
             <a:endParaRPr lang="en-US"/>
           </a:p>
@@ -1771,7 +1769,7 @@
             <a:fld id="{505251C1-60C0-424E-AF6B-263176C83A93}" type="datetimeFigureOut">
               <a:rPr lang="en-US" smtClean="0"/>
               <a:pPr/>
-              <a:t>05/11/16</a:t>
+              <a:t>10/11/16</a:t>
             </a:fld>
             <a:endParaRPr lang="en-US"/>
           </a:p>
@@ -1886,7 +1884,7 @@
             <a:fld id="{505251C1-60C0-424E-AF6B-263176C83A93}" type="datetimeFigureOut">
               <a:rPr lang="en-US" smtClean="0"/>
               <a:pPr/>
-              <a:t>05/11/16</a:t>
+              <a:t>10/11/16</a:t>
             </a:fld>
             <a:endParaRPr lang="en-US"/>
           </a:p>
@@ -1978,7 +1976,7 @@
             <a:fld id="{505251C1-60C0-424E-AF6B-263176C83A93}" type="datetimeFigureOut">
               <a:rPr lang="en-US" smtClean="0"/>
               <a:pPr/>
-              <a:t>05/11/16</a:t>
+              <a:t>10/11/16</a:t>
             </a:fld>
             <a:endParaRPr lang="en-US"/>
           </a:p>
@@ -2252,7 +2250,7 @@
             <a:fld id="{505251C1-60C0-424E-AF6B-263176C83A93}" type="datetimeFigureOut">
               <a:rPr lang="en-US" smtClean="0"/>
               <a:pPr/>
-              <a:t>05/11/16</a:t>
+              <a:t>10/11/16</a:t>
             </a:fld>
             <a:endParaRPr lang="en-US"/>
           </a:p>
@@ -2502,7 +2500,7 @@
             <a:fld id="{505251C1-60C0-424E-AF6B-263176C83A93}" type="datetimeFigureOut">
               <a:rPr lang="en-US" smtClean="0"/>
               <a:pPr/>
-              <a:t>05/11/16</a:t>
+              <a:t>10/11/16</a:t>
             </a:fld>
             <a:endParaRPr lang="en-US"/>
           </a:p>
@@ -2712,7 +2710,7 @@
             <a:fld id="{505251C1-60C0-424E-AF6B-263176C83A93}" type="datetimeFigureOut">
               <a:rPr lang="en-US" smtClean="0"/>
               <a:pPr/>
-              <a:t>05/11/16</a:t>
+              <a:t>10/11/16</a:t>
             </a:fld>
             <a:endParaRPr lang="en-US"/>
           </a:p>
@@ -4290,59 +4288,6 @@
           <a:p>
             <a:r>
               <a:rPr lang="en-US" dirty="0" smtClean="0"/>
-              <a:t>Data Access Object - Example</a:t>
-            </a:r>
-            <a:endParaRPr lang="en-US" dirty="0"/>
-          </a:p>
-        </p:txBody>
-      </p:sp>
-    </p:spTree>
-  </p:cSld>
-  <p:clrMapOvr>
-    <a:masterClrMapping/>
-  </p:clrMapOvr>
-</p:sld>
-</file>
-
-<file path=ppt/slides/slide24.xml><?xml version="1.0" encoding="utf-8"?>
-<p:sld xmlns:a="http://schemas.openxmlformats.org/drawingml/2006/main" xmlns:r="http://schemas.openxmlformats.org/officeDocument/2006/relationships" xmlns:p="http://schemas.openxmlformats.org/presentationml/2006/main">
-  <p:cSld>
-    <p:spTree>
-      <p:nvGrpSpPr>
-        <p:cNvPr id="1" name=""/>
-        <p:cNvGrpSpPr/>
-        <p:nvPr/>
-      </p:nvGrpSpPr>
-      <p:grpSpPr>
-        <a:xfrm>
-          <a:off x="0" y="0"/>
-          <a:ext cx="0" cy="0"/>
-          <a:chOff x="0" y="0"/>
-          <a:chExt cx="0" cy="0"/>
-        </a:xfrm>
-      </p:grpSpPr>
-      <p:sp>
-        <p:nvSpPr>
-          <p:cNvPr id="2" name="Title 1"/>
-          <p:cNvSpPr>
-            <a:spLocks noGrp="1"/>
-          </p:cNvSpPr>
-          <p:nvPr>
-            <p:ph type="ctrTitle"/>
-          </p:nvPr>
-        </p:nvSpPr>
-        <p:spPr>
-          <a:xfrm>
-            <a:off x="533400" y="1"/>
-            <a:ext cx="7772400" cy="1143000"/>
-          </a:xfrm>
-        </p:spPr>
-        <p:txBody>
-          <a:bodyPr/>
-          <a:lstStyle/>
-          <a:p>
-            <a:r>
-              <a:rPr lang="en-US" dirty="0" smtClean="0"/>
               <a:t>Transfer Object</a:t>
             </a:r>
             <a:endParaRPr lang="en-US" dirty="0"/>
@@ -4381,59 +4326,6 @@
           </a:ln>
         </p:spPr>
       </p:pic>
-    </p:spTree>
-  </p:cSld>
-  <p:clrMapOvr>
-    <a:masterClrMapping/>
-  </p:clrMapOvr>
-</p:sld>
-</file>
-
-<file path=ppt/slides/slide25.xml><?xml version="1.0" encoding="utf-8"?>
-<p:sld xmlns:a="http://schemas.openxmlformats.org/drawingml/2006/main" xmlns:r="http://schemas.openxmlformats.org/officeDocument/2006/relationships" xmlns:p="http://schemas.openxmlformats.org/presentationml/2006/main">
-  <p:cSld>
-    <p:spTree>
-      <p:nvGrpSpPr>
-        <p:cNvPr id="1" name=""/>
-        <p:cNvGrpSpPr/>
-        <p:nvPr/>
-      </p:nvGrpSpPr>
-      <p:grpSpPr>
-        <a:xfrm>
-          <a:off x="0" y="0"/>
-          <a:ext cx="0" cy="0"/>
-          <a:chOff x="0" y="0"/>
-          <a:chExt cx="0" cy="0"/>
-        </a:xfrm>
-      </p:grpSpPr>
-      <p:sp>
-        <p:nvSpPr>
-          <p:cNvPr id="2" name="Title 1"/>
-          <p:cNvSpPr>
-            <a:spLocks noGrp="1"/>
-          </p:cNvSpPr>
-          <p:nvPr>
-            <p:ph type="ctrTitle"/>
-          </p:nvPr>
-        </p:nvSpPr>
-        <p:spPr>
-          <a:xfrm>
-            <a:off x="533400" y="1"/>
-            <a:ext cx="7772400" cy="1143000"/>
-          </a:xfrm>
-        </p:spPr>
-        <p:txBody>
-          <a:bodyPr/>
-          <a:lstStyle/>
-          <a:p>
-            <a:r>
-              <a:rPr lang="en-US" dirty="0" smtClean="0"/>
-              <a:t>Transfer Object - Example</a:t>
-            </a:r>
-            <a:endParaRPr lang="en-US" dirty="0"/>
-          </a:p>
-        </p:txBody>
-      </p:sp>
     </p:spTree>
   </p:cSld>
   <p:clrMapOvr>

</xml_diff>